<commit_message>
Updates from Oct testing event
</commit_message>
<xml_diff>
--- a/input/images/PCT_bundles.pptx
+++ b/input/images/PCT_bundles.pptx
@@ -4,6 +4,9 @@
   <p:sldMasterIdLst>
     <p:sldMasterId id="2147483648" r:id="rId1"/>
   </p:sldMasterIdLst>
+  <p:notesMasterIdLst>
+    <p:notesMasterId r:id="rId3"/>
+  </p:notesMasterIdLst>
   <p:sldIdLst>
     <p:sldId id="256" r:id="rId2"/>
   </p:sldIdLst>
@@ -112,6 +115,439 @@
 </p:presentation>
 </file>
 
+<file path=ppt/notesMasters/notesMaster1.xml><?xml version="1.0" encoding="utf-8"?>
+<p:notesMaster xmlns:a="http://schemas.openxmlformats.org/drawingml/2006/main" xmlns:r="http://schemas.openxmlformats.org/officeDocument/2006/relationships" xmlns:p="http://schemas.openxmlformats.org/presentationml/2006/main">
+  <p:cSld>
+    <p:bg>
+      <p:bgRef idx="1001">
+        <a:schemeClr val="bg1"/>
+      </p:bgRef>
+    </p:bg>
+    <p:spTree>
+      <p:nvGrpSpPr>
+        <p:cNvPr id="1" name=""/>
+        <p:cNvGrpSpPr/>
+        <p:nvPr/>
+      </p:nvGrpSpPr>
+      <p:grpSpPr>
+        <a:xfrm>
+          <a:off x="0" y="0"/>
+          <a:ext cx="0" cy="0"/>
+          <a:chOff x="0" y="0"/>
+          <a:chExt cx="0" cy="0"/>
+        </a:xfrm>
+      </p:grpSpPr>
+      <p:sp>
+        <p:nvSpPr>
+          <p:cNvPr id="2" name="Header Placeholder 1"/>
+          <p:cNvSpPr>
+            <a:spLocks noGrp="1"/>
+          </p:cNvSpPr>
+          <p:nvPr>
+            <p:ph type="hdr" sz="quarter"/>
+          </p:nvPr>
+        </p:nvSpPr>
+        <p:spPr>
+          <a:xfrm>
+            <a:off x="0" y="0"/>
+            <a:ext cx="2971800" cy="458788"/>
+          </a:xfrm>
+          <a:prstGeom prst="rect">
+            <a:avLst/>
+          </a:prstGeom>
+        </p:spPr>
+        <p:txBody>
+          <a:bodyPr vert="horz" lIns="91440" tIns="45720" rIns="91440" bIns="45720" rtlCol="0"/>
+          <a:lstStyle>
+            <a:lvl1pPr algn="l">
+              <a:defRPr sz="1200"/>
+            </a:lvl1pPr>
+          </a:lstStyle>
+          <a:p>
+            <a:endParaRPr lang="en-US"/>
+          </a:p>
+        </p:txBody>
+      </p:sp>
+      <p:sp>
+        <p:nvSpPr>
+          <p:cNvPr id="3" name="Date Placeholder 2"/>
+          <p:cNvSpPr>
+            <a:spLocks noGrp="1"/>
+          </p:cNvSpPr>
+          <p:nvPr>
+            <p:ph type="dt" idx="1"/>
+          </p:nvPr>
+        </p:nvSpPr>
+        <p:spPr>
+          <a:xfrm>
+            <a:off x="3884613" y="0"/>
+            <a:ext cx="2971800" cy="458788"/>
+          </a:xfrm>
+          <a:prstGeom prst="rect">
+            <a:avLst/>
+          </a:prstGeom>
+        </p:spPr>
+        <p:txBody>
+          <a:bodyPr vert="horz" lIns="91440" tIns="45720" rIns="91440" bIns="45720" rtlCol="0"/>
+          <a:lstStyle>
+            <a:lvl1pPr algn="r">
+              <a:defRPr sz="1200"/>
+            </a:lvl1pPr>
+          </a:lstStyle>
+          <a:p>
+            <a:fld id="{A2C95764-E0FA-0A43-A86C-F3BAB03EE38B}" type="datetimeFigureOut">
+              <a:rPr lang="en-US" smtClean="0"/>
+              <a:t>10/31/21</a:t>
+            </a:fld>
+            <a:endParaRPr lang="en-US"/>
+          </a:p>
+        </p:txBody>
+      </p:sp>
+      <p:sp>
+        <p:nvSpPr>
+          <p:cNvPr id="4" name="Slide Image Placeholder 3"/>
+          <p:cNvSpPr>
+            <a:spLocks noGrp="1" noRot="1" noChangeAspect="1"/>
+          </p:cNvSpPr>
+          <p:nvPr>
+            <p:ph type="sldImg" idx="2"/>
+          </p:nvPr>
+        </p:nvSpPr>
+        <p:spPr>
+          <a:xfrm>
+            <a:off x="685800" y="1143000"/>
+            <a:ext cx="5486400" cy="3086100"/>
+          </a:xfrm>
+          <a:prstGeom prst="rect">
+            <a:avLst/>
+          </a:prstGeom>
+          <a:noFill/>
+          <a:ln w="12700">
+            <a:solidFill>
+              <a:prstClr val="black"/>
+            </a:solidFill>
+          </a:ln>
+        </p:spPr>
+        <p:txBody>
+          <a:bodyPr vert="horz" lIns="91440" tIns="45720" rIns="91440" bIns="45720" rtlCol="0" anchor="ctr"/>
+          <a:lstStyle/>
+          <a:p>
+            <a:endParaRPr lang="en-US"/>
+          </a:p>
+        </p:txBody>
+      </p:sp>
+      <p:sp>
+        <p:nvSpPr>
+          <p:cNvPr id="5" name="Notes Placeholder 4"/>
+          <p:cNvSpPr>
+            <a:spLocks noGrp="1"/>
+          </p:cNvSpPr>
+          <p:nvPr>
+            <p:ph type="body" sz="quarter" idx="3"/>
+          </p:nvPr>
+        </p:nvSpPr>
+        <p:spPr>
+          <a:xfrm>
+            <a:off x="685800" y="4400550"/>
+            <a:ext cx="5486400" cy="3600450"/>
+          </a:xfrm>
+          <a:prstGeom prst="rect">
+            <a:avLst/>
+          </a:prstGeom>
+        </p:spPr>
+        <p:txBody>
+          <a:bodyPr vert="horz" lIns="91440" tIns="45720" rIns="91440" bIns="45720" rtlCol="0"/>
+          <a:lstStyle/>
+          <a:p>
+            <a:pPr lvl="0"/>
+            <a:r>
+              <a:rPr lang="en-US"/>
+              <a:t>Click to edit Master text styles</a:t>
+            </a:r>
+          </a:p>
+          <a:p>
+            <a:pPr lvl="1"/>
+            <a:r>
+              <a:rPr lang="en-US"/>
+              <a:t>Second level</a:t>
+            </a:r>
+          </a:p>
+          <a:p>
+            <a:pPr lvl="2"/>
+            <a:r>
+              <a:rPr lang="en-US"/>
+              <a:t>Third level</a:t>
+            </a:r>
+          </a:p>
+          <a:p>
+            <a:pPr lvl="3"/>
+            <a:r>
+              <a:rPr lang="en-US"/>
+              <a:t>Fourth level</a:t>
+            </a:r>
+          </a:p>
+          <a:p>
+            <a:pPr lvl="4"/>
+            <a:r>
+              <a:rPr lang="en-US"/>
+              <a:t>Fifth level</a:t>
+            </a:r>
+          </a:p>
+        </p:txBody>
+      </p:sp>
+      <p:sp>
+        <p:nvSpPr>
+          <p:cNvPr id="6" name="Footer Placeholder 5"/>
+          <p:cNvSpPr>
+            <a:spLocks noGrp="1"/>
+          </p:cNvSpPr>
+          <p:nvPr>
+            <p:ph type="ftr" sz="quarter" idx="4"/>
+          </p:nvPr>
+        </p:nvSpPr>
+        <p:spPr>
+          <a:xfrm>
+            <a:off x="0" y="8685213"/>
+            <a:ext cx="2971800" cy="458787"/>
+          </a:xfrm>
+          <a:prstGeom prst="rect">
+            <a:avLst/>
+          </a:prstGeom>
+        </p:spPr>
+        <p:txBody>
+          <a:bodyPr vert="horz" lIns="91440" tIns="45720" rIns="91440" bIns="45720" rtlCol="0" anchor="b"/>
+          <a:lstStyle>
+            <a:lvl1pPr algn="l">
+              <a:defRPr sz="1200"/>
+            </a:lvl1pPr>
+          </a:lstStyle>
+          <a:p>
+            <a:endParaRPr lang="en-US"/>
+          </a:p>
+        </p:txBody>
+      </p:sp>
+      <p:sp>
+        <p:nvSpPr>
+          <p:cNvPr id="7" name="Slide Number Placeholder 6"/>
+          <p:cNvSpPr>
+            <a:spLocks noGrp="1"/>
+          </p:cNvSpPr>
+          <p:nvPr>
+            <p:ph type="sldNum" sz="quarter" idx="5"/>
+          </p:nvPr>
+        </p:nvSpPr>
+        <p:spPr>
+          <a:xfrm>
+            <a:off x="3884613" y="8685213"/>
+            <a:ext cx="2971800" cy="458787"/>
+          </a:xfrm>
+          <a:prstGeom prst="rect">
+            <a:avLst/>
+          </a:prstGeom>
+        </p:spPr>
+        <p:txBody>
+          <a:bodyPr vert="horz" lIns="91440" tIns="45720" rIns="91440" bIns="45720" rtlCol="0" anchor="b"/>
+          <a:lstStyle>
+            <a:lvl1pPr algn="r">
+              <a:defRPr sz="1200"/>
+            </a:lvl1pPr>
+          </a:lstStyle>
+          <a:p>
+            <a:fld id="{9CD3278B-DF6F-F04D-982A-DEEE3603EB09}" type="slidenum">
+              <a:rPr lang="en-US" smtClean="0"/>
+              <a:t>‹#›</a:t>
+            </a:fld>
+            <a:endParaRPr lang="en-US"/>
+          </a:p>
+        </p:txBody>
+      </p:sp>
+    </p:spTree>
+    <p:extLst>
+      <p:ext uri="{BB962C8B-B14F-4D97-AF65-F5344CB8AC3E}">
+        <p14:creationId xmlns:p14="http://schemas.microsoft.com/office/powerpoint/2010/main" val="667084128"/>
+      </p:ext>
+    </p:extLst>
+  </p:cSld>
+  <p:clrMap bg1="lt1" tx1="dk1" bg2="lt2" tx2="dk2" accent1="accent1" accent2="accent2" accent3="accent3" accent4="accent4" accent5="accent5" accent6="accent6" hlink="hlink" folHlink="folHlink"/>
+  <p:notesStyle>
+    <a:lvl1pPr marL="0" algn="l" defTabSz="914400" rtl="0" eaLnBrk="1" latinLnBrk="0" hangingPunct="1">
+      <a:defRPr sz="1200" kern="1200">
+        <a:solidFill>
+          <a:schemeClr val="tx1"/>
+        </a:solidFill>
+        <a:latin typeface="+mn-lt"/>
+        <a:ea typeface="+mn-ea"/>
+        <a:cs typeface="+mn-cs"/>
+      </a:defRPr>
+    </a:lvl1pPr>
+    <a:lvl2pPr marL="457200" algn="l" defTabSz="914400" rtl="0" eaLnBrk="1" latinLnBrk="0" hangingPunct="1">
+      <a:defRPr sz="1200" kern="1200">
+        <a:solidFill>
+          <a:schemeClr val="tx1"/>
+        </a:solidFill>
+        <a:latin typeface="+mn-lt"/>
+        <a:ea typeface="+mn-ea"/>
+        <a:cs typeface="+mn-cs"/>
+      </a:defRPr>
+    </a:lvl2pPr>
+    <a:lvl3pPr marL="914400" algn="l" defTabSz="914400" rtl="0" eaLnBrk="1" latinLnBrk="0" hangingPunct="1">
+      <a:defRPr sz="1200" kern="1200">
+        <a:solidFill>
+          <a:schemeClr val="tx1"/>
+        </a:solidFill>
+        <a:latin typeface="+mn-lt"/>
+        <a:ea typeface="+mn-ea"/>
+        <a:cs typeface="+mn-cs"/>
+      </a:defRPr>
+    </a:lvl3pPr>
+    <a:lvl4pPr marL="1371600" algn="l" defTabSz="914400" rtl="0" eaLnBrk="1" latinLnBrk="0" hangingPunct="1">
+      <a:defRPr sz="1200" kern="1200">
+        <a:solidFill>
+          <a:schemeClr val="tx1"/>
+        </a:solidFill>
+        <a:latin typeface="+mn-lt"/>
+        <a:ea typeface="+mn-ea"/>
+        <a:cs typeface="+mn-cs"/>
+      </a:defRPr>
+    </a:lvl4pPr>
+    <a:lvl5pPr marL="1828800" algn="l" defTabSz="914400" rtl="0" eaLnBrk="1" latinLnBrk="0" hangingPunct="1">
+      <a:defRPr sz="1200" kern="1200">
+        <a:solidFill>
+          <a:schemeClr val="tx1"/>
+        </a:solidFill>
+        <a:latin typeface="+mn-lt"/>
+        <a:ea typeface="+mn-ea"/>
+        <a:cs typeface="+mn-cs"/>
+      </a:defRPr>
+    </a:lvl5pPr>
+    <a:lvl6pPr marL="2286000" algn="l" defTabSz="914400" rtl="0" eaLnBrk="1" latinLnBrk="0" hangingPunct="1">
+      <a:defRPr sz="1200" kern="1200">
+        <a:solidFill>
+          <a:schemeClr val="tx1"/>
+        </a:solidFill>
+        <a:latin typeface="+mn-lt"/>
+        <a:ea typeface="+mn-ea"/>
+        <a:cs typeface="+mn-cs"/>
+      </a:defRPr>
+    </a:lvl6pPr>
+    <a:lvl7pPr marL="2743200" algn="l" defTabSz="914400" rtl="0" eaLnBrk="1" latinLnBrk="0" hangingPunct="1">
+      <a:defRPr sz="1200" kern="1200">
+        <a:solidFill>
+          <a:schemeClr val="tx1"/>
+        </a:solidFill>
+        <a:latin typeface="+mn-lt"/>
+        <a:ea typeface="+mn-ea"/>
+        <a:cs typeface="+mn-cs"/>
+      </a:defRPr>
+    </a:lvl7pPr>
+    <a:lvl8pPr marL="3200400" algn="l" defTabSz="914400" rtl="0" eaLnBrk="1" latinLnBrk="0" hangingPunct="1">
+      <a:defRPr sz="1200" kern="1200">
+        <a:solidFill>
+          <a:schemeClr val="tx1"/>
+        </a:solidFill>
+        <a:latin typeface="+mn-lt"/>
+        <a:ea typeface="+mn-ea"/>
+        <a:cs typeface="+mn-cs"/>
+      </a:defRPr>
+    </a:lvl8pPr>
+    <a:lvl9pPr marL="3657600" algn="l" defTabSz="914400" rtl="0" eaLnBrk="1" latinLnBrk="0" hangingPunct="1">
+      <a:defRPr sz="1200" kern="1200">
+        <a:solidFill>
+          <a:schemeClr val="tx1"/>
+        </a:solidFill>
+        <a:latin typeface="+mn-lt"/>
+        <a:ea typeface="+mn-ea"/>
+        <a:cs typeface="+mn-cs"/>
+      </a:defRPr>
+    </a:lvl9pPr>
+  </p:notesStyle>
+</p:notesMaster>
+</file>
+
+<file path=ppt/notesSlides/notesSlide1.xml><?xml version="1.0" encoding="utf-8"?>
+<p:notes xmlns:a="http://schemas.openxmlformats.org/drawingml/2006/main" xmlns:r="http://schemas.openxmlformats.org/officeDocument/2006/relationships" xmlns:p="http://schemas.openxmlformats.org/presentationml/2006/main">
+  <p:cSld>
+    <p:spTree>
+      <p:nvGrpSpPr>
+        <p:cNvPr id="1" name=""/>
+        <p:cNvGrpSpPr/>
+        <p:nvPr/>
+      </p:nvGrpSpPr>
+      <p:grpSpPr>
+        <a:xfrm>
+          <a:off x="0" y="0"/>
+          <a:ext cx="0" cy="0"/>
+          <a:chOff x="0" y="0"/>
+          <a:chExt cx="0" cy="0"/>
+        </a:xfrm>
+      </p:grpSpPr>
+      <p:sp>
+        <p:nvSpPr>
+          <p:cNvPr id="2" name="Slide Image Placeholder 1"/>
+          <p:cNvSpPr>
+            <a:spLocks noGrp="1" noRot="1" noChangeAspect="1"/>
+          </p:cNvSpPr>
+          <p:nvPr>
+            <p:ph type="sldImg"/>
+          </p:nvPr>
+        </p:nvSpPr>
+        <p:spPr/>
+      </p:sp>
+      <p:sp>
+        <p:nvSpPr>
+          <p:cNvPr id="3" name="Notes Placeholder 2"/>
+          <p:cNvSpPr>
+            <a:spLocks noGrp="1"/>
+          </p:cNvSpPr>
+          <p:nvPr>
+            <p:ph type="body" idx="1"/>
+          </p:nvPr>
+        </p:nvSpPr>
+        <p:spPr/>
+        <p:txBody>
+          <a:bodyPr/>
+          <a:lstStyle/>
+          <a:p>
+            <a:endParaRPr lang="en-US" dirty="0"/>
+          </a:p>
+        </p:txBody>
+      </p:sp>
+      <p:sp>
+        <p:nvSpPr>
+          <p:cNvPr id="4" name="Slide Number Placeholder 3"/>
+          <p:cNvSpPr>
+            <a:spLocks noGrp="1"/>
+          </p:cNvSpPr>
+          <p:nvPr>
+            <p:ph type="sldNum" sz="quarter" idx="5"/>
+          </p:nvPr>
+        </p:nvSpPr>
+        <p:spPr/>
+        <p:txBody>
+          <a:bodyPr/>
+          <a:lstStyle/>
+          <a:p>
+            <a:fld id="{9CD3278B-DF6F-F04D-982A-DEEE3603EB09}" type="slidenum">
+              <a:rPr lang="en-US" smtClean="0"/>
+              <a:t>1</a:t>
+            </a:fld>
+            <a:endParaRPr lang="en-US"/>
+          </a:p>
+        </p:txBody>
+      </p:sp>
+    </p:spTree>
+    <p:extLst>
+      <p:ext uri="{BB962C8B-B14F-4D97-AF65-F5344CB8AC3E}">
+        <p14:creationId xmlns:p14="http://schemas.microsoft.com/office/powerpoint/2010/main" val="2072254811"/>
+      </p:ext>
+    </p:extLst>
+  </p:cSld>
+  <p:clrMapOvr>
+    <a:masterClrMapping/>
+  </p:clrMapOvr>
+</p:notes>
+</file>
+
 <file path=ppt/slideLayouts/slideLayout1.xml><?xml version="1.0" encoding="utf-8"?>
 <p:sldLayout xmlns:a="http://schemas.openxmlformats.org/drawingml/2006/main" xmlns:r="http://schemas.openxmlformats.org/officeDocument/2006/relationships" xmlns:p="http://schemas.openxmlformats.org/presentationml/2006/main" type="title" preserve="1">
   <p:cSld name="Title Slide">
@@ -259,7 +695,7 @@
           <a:p>
             <a:fld id="{18271F4C-9DA1-544F-94AC-914D946BC5DE}" type="datetimeFigureOut">
               <a:rPr lang="en-US" smtClean="0"/>
-              <a:t>10/20/21</a:t>
+              <a:t>10/31/21</a:t>
             </a:fld>
             <a:endParaRPr lang="en-US"/>
           </a:p>
@@ -457,7 +893,7 @@
           <a:p>
             <a:fld id="{18271F4C-9DA1-544F-94AC-914D946BC5DE}" type="datetimeFigureOut">
               <a:rPr lang="en-US" smtClean="0"/>
-              <a:t>10/20/21</a:t>
+              <a:t>10/31/21</a:t>
             </a:fld>
             <a:endParaRPr lang="en-US"/>
           </a:p>
@@ -665,7 +1101,7 @@
           <a:p>
             <a:fld id="{18271F4C-9DA1-544F-94AC-914D946BC5DE}" type="datetimeFigureOut">
               <a:rPr lang="en-US" smtClean="0"/>
-              <a:t>10/20/21</a:t>
+              <a:t>10/31/21</a:t>
             </a:fld>
             <a:endParaRPr lang="en-US"/>
           </a:p>
@@ -863,7 +1299,7 @@
           <a:p>
             <a:fld id="{18271F4C-9DA1-544F-94AC-914D946BC5DE}" type="datetimeFigureOut">
               <a:rPr lang="en-US" smtClean="0"/>
-              <a:t>10/20/21</a:t>
+              <a:t>10/31/21</a:t>
             </a:fld>
             <a:endParaRPr lang="en-US"/>
           </a:p>
@@ -1138,7 +1574,7 @@
           <a:p>
             <a:fld id="{18271F4C-9DA1-544F-94AC-914D946BC5DE}" type="datetimeFigureOut">
               <a:rPr lang="en-US" smtClean="0"/>
-              <a:t>10/20/21</a:t>
+              <a:t>10/31/21</a:t>
             </a:fld>
             <a:endParaRPr lang="en-US"/>
           </a:p>
@@ -1403,7 +1839,7 @@
           <a:p>
             <a:fld id="{18271F4C-9DA1-544F-94AC-914D946BC5DE}" type="datetimeFigureOut">
               <a:rPr lang="en-US" smtClean="0"/>
-              <a:t>10/20/21</a:t>
+              <a:t>10/31/21</a:t>
             </a:fld>
             <a:endParaRPr lang="en-US"/>
           </a:p>
@@ -1815,7 +2251,7 @@
           <a:p>
             <a:fld id="{18271F4C-9DA1-544F-94AC-914D946BC5DE}" type="datetimeFigureOut">
               <a:rPr lang="en-US" smtClean="0"/>
-              <a:t>10/20/21</a:t>
+              <a:t>10/31/21</a:t>
             </a:fld>
             <a:endParaRPr lang="en-US"/>
           </a:p>
@@ -1956,7 +2392,7 @@
           <a:p>
             <a:fld id="{18271F4C-9DA1-544F-94AC-914D946BC5DE}" type="datetimeFigureOut">
               <a:rPr lang="en-US" smtClean="0"/>
-              <a:t>10/20/21</a:t>
+              <a:t>10/31/21</a:t>
             </a:fld>
             <a:endParaRPr lang="en-US"/>
           </a:p>
@@ -2069,7 +2505,7 @@
           <a:p>
             <a:fld id="{18271F4C-9DA1-544F-94AC-914D946BC5DE}" type="datetimeFigureOut">
               <a:rPr lang="en-US" smtClean="0"/>
-              <a:t>10/20/21</a:t>
+              <a:t>10/31/21</a:t>
             </a:fld>
             <a:endParaRPr lang="en-US"/>
           </a:p>
@@ -2380,7 +2816,7 @@
           <a:p>
             <a:fld id="{18271F4C-9DA1-544F-94AC-914D946BC5DE}" type="datetimeFigureOut">
               <a:rPr lang="en-US" smtClean="0"/>
-              <a:t>10/20/21</a:t>
+              <a:t>10/31/21</a:t>
             </a:fld>
             <a:endParaRPr lang="en-US"/>
           </a:p>
@@ -2668,7 +3104,7 @@
           <a:p>
             <a:fld id="{18271F4C-9DA1-544F-94AC-914D946BC5DE}" type="datetimeFigureOut">
               <a:rPr lang="en-US" smtClean="0"/>
-              <a:t>10/20/21</a:t>
+              <a:t>10/31/21</a:t>
             </a:fld>
             <a:endParaRPr lang="en-US"/>
           </a:p>
@@ -2909,7 +3345,7 @@
           <a:p>
             <a:fld id="{18271F4C-9DA1-544F-94AC-914D946BC5DE}" type="datetimeFigureOut">
               <a:rPr lang="en-US" smtClean="0"/>
-              <a:t>10/20/21</a:t>
+              <a:t>10/31/21</a:t>
             </a:fld>
             <a:endParaRPr lang="en-US"/>
           </a:p>
@@ -3340,8 +3776,8 @@
         </p:nvSpPr>
         <p:spPr>
           <a:xfrm>
-            <a:off x="1502229" y="811480"/>
-            <a:ext cx="4593771" cy="5208664"/>
+            <a:off x="655004" y="164965"/>
+            <a:ext cx="5548889" cy="6570617"/>
           </a:xfrm>
           <a:prstGeom prst="flowChartAlternateProcess">
             <a:avLst/>
@@ -3386,8 +3822,8 @@
         </p:nvSpPr>
         <p:spPr>
           <a:xfrm>
-            <a:off x="6273073" y="811480"/>
-            <a:ext cx="4699727" cy="5208664"/>
+            <a:off x="6293635" y="164965"/>
+            <a:ext cx="5495594" cy="6570617"/>
           </a:xfrm>
           <a:prstGeom prst="flowChartAlternateProcess">
             <a:avLst/>
@@ -3420,10 +3856,80 @@
       </p:sp>
       <p:sp>
         <p:nvSpPr>
-          <p:cNvPr id="6" name="Alternate Process 5">
-            <a:extLst>
-              <a:ext uri="{FF2B5EF4-FFF2-40B4-BE49-F238E27FC236}">
-                <a16:creationId xmlns:a16="http://schemas.microsoft.com/office/drawing/2014/main" id="{032EDBC8-C129-2E4C-AEDC-F7657948B788}"/>
+          <p:cNvPr id="13" name="TextBox 12">
+            <a:extLst>
+              <a:ext uri="{FF2B5EF4-FFF2-40B4-BE49-F238E27FC236}">
+                <a16:creationId xmlns:a16="http://schemas.microsoft.com/office/drawing/2014/main" id="{0A9C4C9D-D717-FD42-A09D-729C0BD0317D}"/>
+              </a:ext>
+            </a:extLst>
+          </p:cNvPr>
+          <p:cNvSpPr txBox="1"/>
+          <p:nvPr/>
+        </p:nvSpPr>
+        <p:spPr>
+          <a:xfrm>
+            <a:off x="2441885" y="123919"/>
+            <a:ext cx="2149014" cy="461665"/>
+          </a:xfrm>
+          <a:prstGeom prst="rect">
+            <a:avLst/>
+          </a:prstGeom>
+          <a:noFill/>
+        </p:spPr>
+        <p:txBody>
+          <a:bodyPr wrap="square" rtlCol="0">
+            <a:spAutoFit/>
+          </a:bodyPr>
+          <a:lstStyle/>
+          <a:p>
+            <a:r>
+              <a:rPr lang="en-US" sz="2400" dirty="0"/>
+              <a:t>PCT GFE Bundle</a:t>
+            </a:r>
+          </a:p>
+        </p:txBody>
+      </p:sp>
+      <p:sp>
+        <p:nvSpPr>
+          <p:cNvPr id="14" name="TextBox 13">
+            <a:extLst>
+              <a:ext uri="{FF2B5EF4-FFF2-40B4-BE49-F238E27FC236}">
+                <a16:creationId xmlns:a16="http://schemas.microsoft.com/office/drawing/2014/main" id="{1EE320BA-224E-9E4D-B80B-99AB3D54D2D2}"/>
+              </a:ext>
+            </a:extLst>
+          </p:cNvPr>
+          <p:cNvSpPr txBox="1"/>
+          <p:nvPr/>
+        </p:nvSpPr>
+        <p:spPr>
+          <a:xfrm>
+            <a:off x="7697149" y="131096"/>
+            <a:ext cx="2375867" cy="461665"/>
+          </a:xfrm>
+          <a:prstGeom prst="rect">
+            <a:avLst/>
+          </a:prstGeom>
+          <a:noFill/>
+        </p:spPr>
+        <p:txBody>
+          <a:bodyPr wrap="square" rtlCol="0">
+            <a:spAutoFit/>
+          </a:bodyPr>
+          <a:lstStyle/>
+          <a:p>
+            <a:r>
+              <a:rPr lang="en-US" sz="2400" dirty="0"/>
+              <a:t>PCT AEOB Bundle</a:t>
+            </a:r>
+          </a:p>
+        </p:txBody>
+      </p:sp>
+      <p:sp>
+        <p:nvSpPr>
+          <p:cNvPr id="26" name="Alternate Process 25">
+            <a:extLst>
+              <a:ext uri="{FF2B5EF4-FFF2-40B4-BE49-F238E27FC236}">
+                <a16:creationId xmlns:a16="http://schemas.microsoft.com/office/drawing/2014/main" id="{62098F33-DC2E-D74C-82F7-E174A1199AD6}"/>
               </a:ext>
             </a:extLst>
           </p:cNvPr>
@@ -3432,8 +3938,313 @@
         </p:nvSpPr>
         <p:spPr>
           <a:xfrm>
-            <a:off x="1945322" y="1366648"/>
-            <a:ext cx="3707583" cy="4124703"/>
+            <a:off x="6575382" y="500211"/>
+            <a:ext cx="4961613" cy="5983185"/>
+          </a:xfrm>
+          <a:prstGeom prst="flowChartAlternateProcess">
+            <a:avLst/>
+          </a:prstGeom>
+          <a:solidFill>
+            <a:srgbClr val="00B0F0"/>
+          </a:solidFill>
+        </p:spPr>
+        <p:style>
+          <a:lnRef idx="2">
+            <a:schemeClr val="accent2">
+              <a:shade val="50000"/>
+            </a:schemeClr>
+          </a:lnRef>
+          <a:fillRef idx="1">
+            <a:schemeClr val="accent2"/>
+          </a:fillRef>
+          <a:effectRef idx="0">
+            <a:schemeClr val="accent2"/>
+          </a:effectRef>
+          <a:fontRef idx="minor">
+            <a:schemeClr val="lt1"/>
+          </a:fontRef>
+        </p:style>
+        <p:txBody>
+          <a:bodyPr rtlCol="0" anchor="ctr"/>
+          <a:lstStyle/>
+          <a:p>
+            <a:pPr algn="ctr"/>
+            <a:endParaRPr lang="en-US" sz="2000" dirty="0"/>
+          </a:p>
+        </p:txBody>
+      </p:sp>
+      <p:sp>
+        <p:nvSpPr>
+          <p:cNvPr id="20" name="TextBox 19">
+            <a:extLst>
+              <a:ext uri="{FF2B5EF4-FFF2-40B4-BE49-F238E27FC236}">
+                <a16:creationId xmlns:a16="http://schemas.microsoft.com/office/drawing/2014/main" id="{CC795DAE-72ED-CC42-96D0-71BEBA4E3A5A}"/>
+              </a:ext>
+            </a:extLst>
+          </p:cNvPr>
+          <p:cNvSpPr txBox="1"/>
+          <p:nvPr/>
+        </p:nvSpPr>
+        <p:spPr>
+          <a:xfrm>
+            <a:off x="6885354" y="538407"/>
+            <a:ext cx="4018953" cy="307777"/>
+          </a:xfrm>
+          <a:prstGeom prst="rect">
+            <a:avLst/>
+          </a:prstGeom>
+          <a:noFill/>
+        </p:spPr>
+        <p:txBody>
+          <a:bodyPr wrap="square">
+            <a:spAutoFit/>
+          </a:bodyPr>
+          <a:lstStyle/>
+          <a:p>
+            <a:pPr algn="ctr"/>
+            <a:r>
+              <a:rPr lang="en-US" sz="1400" dirty="0"/>
+              <a:t>PCT Advanced Explanation of Benefits (AEOB) (1..1)</a:t>
+            </a:r>
+          </a:p>
+        </p:txBody>
+      </p:sp>
+      <p:sp>
+        <p:nvSpPr>
+          <p:cNvPr id="8" name="Alternate Process 7">
+            <a:extLst>
+              <a:ext uri="{FF2B5EF4-FFF2-40B4-BE49-F238E27FC236}">
+                <a16:creationId xmlns:a16="http://schemas.microsoft.com/office/drawing/2014/main" id="{26D8E5D0-237D-9845-AE8D-D1AAD611D73F}"/>
+              </a:ext>
+            </a:extLst>
+          </p:cNvPr>
+          <p:cNvSpPr/>
+          <p:nvPr/>
+        </p:nvSpPr>
+        <p:spPr>
+          <a:xfrm>
+            <a:off x="6754866" y="1407384"/>
+            <a:ext cx="1501553" cy="421278"/>
+          </a:xfrm>
+          <a:prstGeom prst="flowChartAlternateProcess">
+            <a:avLst/>
+          </a:prstGeom>
+          <a:solidFill>
+            <a:schemeClr val="accent6">
+              <a:lumMod val="60000"/>
+              <a:lumOff val="40000"/>
+            </a:schemeClr>
+          </a:solidFill>
+        </p:spPr>
+        <p:style>
+          <a:lnRef idx="2">
+            <a:schemeClr val="accent2">
+              <a:shade val="50000"/>
+            </a:schemeClr>
+          </a:lnRef>
+          <a:fillRef idx="1">
+            <a:schemeClr val="accent2"/>
+          </a:fillRef>
+          <a:effectRef idx="0">
+            <a:schemeClr val="accent2"/>
+          </a:effectRef>
+          <a:fontRef idx="minor">
+            <a:schemeClr val="lt1"/>
+          </a:fontRef>
+        </p:style>
+        <p:txBody>
+          <a:bodyPr rtlCol="0" anchor="ctr"/>
+          <a:lstStyle/>
+          <a:p>
+            <a:pPr algn="ctr"/>
+            <a:r>
+              <a:rPr lang="en-US" sz="1400" dirty="0"/>
+              <a:t>PCT Patient</a:t>
+            </a:r>
+          </a:p>
+        </p:txBody>
+      </p:sp>
+      <p:sp>
+        <p:nvSpPr>
+          <p:cNvPr id="12" name="Alternate Process 11">
+            <a:extLst>
+              <a:ext uri="{FF2B5EF4-FFF2-40B4-BE49-F238E27FC236}">
+                <a16:creationId xmlns:a16="http://schemas.microsoft.com/office/drawing/2014/main" id="{5810EB1F-A28D-4B45-80B3-5F190BAF9649}"/>
+              </a:ext>
+            </a:extLst>
+          </p:cNvPr>
+          <p:cNvSpPr/>
+          <p:nvPr/>
+        </p:nvSpPr>
+        <p:spPr>
+          <a:xfrm>
+            <a:off x="8321816" y="1391521"/>
+            <a:ext cx="1501553" cy="453005"/>
+          </a:xfrm>
+          <a:prstGeom prst="flowChartAlternateProcess">
+            <a:avLst/>
+          </a:prstGeom>
+          <a:solidFill>
+            <a:schemeClr val="accent6">
+              <a:lumMod val="60000"/>
+              <a:lumOff val="40000"/>
+            </a:schemeClr>
+          </a:solidFill>
+        </p:spPr>
+        <p:style>
+          <a:lnRef idx="2">
+            <a:schemeClr val="accent2">
+              <a:shade val="50000"/>
+            </a:schemeClr>
+          </a:lnRef>
+          <a:fillRef idx="1">
+            <a:schemeClr val="accent2"/>
+          </a:fillRef>
+          <a:effectRef idx="0">
+            <a:schemeClr val="accent2"/>
+          </a:effectRef>
+          <a:fontRef idx="minor">
+            <a:schemeClr val="lt1"/>
+          </a:fontRef>
+        </p:style>
+        <p:txBody>
+          <a:bodyPr rtlCol="0" anchor="ctr"/>
+          <a:lstStyle/>
+          <a:p>
+            <a:pPr algn="ctr"/>
+            <a:r>
+              <a:rPr lang="en-US" sz="1400" dirty="0"/>
+              <a:t>PCT Organization (Provider)</a:t>
+            </a:r>
+          </a:p>
+        </p:txBody>
+      </p:sp>
+      <p:sp>
+        <p:nvSpPr>
+          <p:cNvPr id="19" name="Alternate Process 18">
+            <a:extLst>
+              <a:ext uri="{FF2B5EF4-FFF2-40B4-BE49-F238E27FC236}">
+                <a16:creationId xmlns:a16="http://schemas.microsoft.com/office/drawing/2014/main" id="{495F211F-96DC-724E-9067-B15A14F8CB46}"/>
+              </a:ext>
+            </a:extLst>
+          </p:cNvPr>
+          <p:cNvSpPr/>
+          <p:nvPr/>
+        </p:nvSpPr>
+        <p:spPr>
+          <a:xfrm>
+            <a:off x="9896216" y="1393360"/>
+            <a:ext cx="1495762" cy="453006"/>
+          </a:xfrm>
+          <a:prstGeom prst="flowChartAlternateProcess">
+            <a:avLst/>
+          </a:prstGeom>
+          <a:solidFill>
+            <a:schemeClr val="accent6">
+              <a:lumMod val="60000"/>
+              <a:lumOff val="40000"/>
+            </a:schemeClr>
+          </a:solidFill>
+        </p:spPr>
+        <p:style>
+          <a:lnRef idx="2">
+            <a:schemeClr val="accent2">
+              <a:shade val="50000"/>
+            </a:schemeClr>
+          </a:lnRef>
+          <a:fillRef idx="1">
+            <a:schemeClr val="accent2"/>
+          </a:fillRef>
+          <a:effectRef idx="0">
+            <a:schemeClr val="accent2"/>
+          </a:effectRef>
+          <a:fontRef idx="minor">
+            <a:schemeClr val="lt1"/>
+          </a:fontRef>
+        </p:style>
+        <p:txBody>
+          <a:bodyPr rtlCol="0" anchor="ctr"/>
+          <a:lstStyle/>
+          <a:p>
+            <a:pPr algn="ctr"/>
+            <a:r>
+              <a:rPr lang="en-US" sz="1400" dirty="0"/>
+              <a:t>PCT Organization (Payer)</a:t>
+            </a:r>
+          </a:p>
+        </p:txBody>
+      </p:sp>
+      <p:sp>
+        <p:nvSpPr>
+          <p:cNvPr id="18" name="Alternate Process 17">
+            <a:extLst>
+              <a:ext uri="{FF2B5EF4-FFF2-40B4-BE49-F238E27FC236}">
+                <a16:creationId xmlns:a16="http://schemas.microsoft.com/office/drawing/2014/main" id="{1E69A2EE-F9A2-0E4F-AE7F-24A6A246EED3}"/>
+              </a:ext>
+            </a:extLst>
+          </p:cNvPr>
+          <p:cNvSpPr/>
+          <p:nvPr/>
+        </p:nvSpPr>
+        <p:spPr>
+          <a:xfrm>
+            <a:off x="8331098" y="2297318"/>
+            <a:ext cx="1501553" cy="456351"/>
+          </a:xfrm>
+          <a:prstGeom prst="flowChartAlternateProcess">
+            <a:avLst/>
+          </a:prstGeom>
+          <a:solidFill>
+            <a:schemeClr val="accent6">
+              <a:lumMod val="60000"/>
+              <a:lumOff val="40000"/>
+            </a:schemeClr>
+          </a:solidFill>
+        </p:spPr>
+        <p:style>
+          <a:lnRef idx="2">
+            <a:schemeClr val="accent2">
+              <a:shade val="50000"/>
+            </a:schemeClr>
+          </a:lnRef>
+          <a:fillRef idx="1">
+            <a:schemeClr val="accent2"/>
+          </a:fillRef>
+          <a:effectRef idx="0">
+            <a:schemeClr val="accent2"/>
+          </a:effectRef>
+          <a:fontRef idx="minor">
+            <a:schemeClr val="lt1"/>
+          </a:fontRef>
+        </p:style>
+        <p:txBody>
+          <a:bodyPr rtlCol="0" anchor="ctr"/>
+          <a:lstStyle/>
+          <a:p>
+            <a:pPr algn="ctr"/>
+            <a:r>
+              <a:rPr lang="en-US" sz="1400" dirty="0"/>
+              <a:t>PCT Coverage</a:t>
+            </a:r>
+          </a:p>
+        </p:txBody>
+      </p:sp>
+      <p:sp>
+        <p:nvSpPr>
+          <p:cNvPr id="22" name="Alternate Process 21">
+            <a:extLst>
+              <a:ext uri="{FF2B5EF4-FFF2-40B4-BE49-F238E27FC236}">
+                <a16:creationId xmlns:a16="http://schemas.microsoft.com/office/drawing/2014/main" id="{6F6870D2-0637-2B45-BF15-7BF313FD1428}"/>
+              </a:ext>
+            </a:extLst>
+          </p:cNvPr>
+          <p:cNvSpPr/>
+          <p:nvPr/>
+        </p:nvSpPr>
+        <p:spPr>
+          <a:xfrm>
+            <a:off x="961701" y="500211"/>
+            <a:ext cx="4967392" cy="6142252"/>
           </a:xfrm>
           <a:prstGeom prst="flowChartAlternateProcess">
             <a:avLst/>
@@ -3460,19 +4271,16 @@
           <a:lstStyle/>
           <a:p>
             <a:pPr algn="ctr"/>
-            <a:r>
-              <a:rPr lang="en-US" sz="2000" dirty="0"/>
-              <a:t>PCTGoodFaithEstimate (1..*)</a:t>
-            </a:r>
-          </a:p>
-        </p:txBody>
-      </p:sp>
-      <p:sp>
-        <p:nvSpPr>
-          <p:cNvPr id="13" name="TextBox 12">
-            <a:extLst>
-              <a:ext uri="{FF2B5EF4-FFF2-40B4-BE49-F238E27FC236}">
-                <a16:creationId xmlns:a16="http://schemas.microsoft.com/office/drawing/2014/main" id="{0A9C4C9D-D717-FD42-A09D-729C0BD0317D}"/>
+            <a:endParaRPr lang="en-US" sz="2000" dirty="0"/>
+          </a:p>
+        </p:txBody>
+      </p:sp>
+      <p:sp>
+        <p:nvSpPr>
+          <p:cNvPr id="23" name="TextBox 22">
+            <a:extLst>
+              <a:ext uri="{FF2B5EF4-FFF2-40B4-BE49-F238E27FC236}">
+                <a16:creationId xmlns:a16="http://schemas.microsoft.com/office/drawing/2014/main" id="{86619AE4-0980-6340-A101-ABC693F2D173}"/>
               </a:ext>
             </a:extLst>
           </p:cNvPr>
@@ -3481,8 +4289,8 @@
         </p:nvSpPr>
         <p:spPr>
           <a:xfrm>
-            <a:off x="2807373" y="891795"/>
-            <a:ext cx="1627101" cy="461665"/>
+            <a:off x="1555332" y="547778"/>
+            <a:ext cx="3666128" cy="307777"/>
           </a:xfrm>
           <a:prstGeom prst="rect">
             <a:avLst/>
@@ -3490,73 +4298,45 @@
           <a:noFill/>
         </p:spPr>
         <p:txBody>
-          <a:bodyPr wrap="square" rtlCol="0">
+          <a:bodyPr wrap="square">
             <a:spAutoFit/>
           </a:bodyPr>
           <a:lstStyle/>
           <a:p>
-            <a:r>
-              <a:rPr lang="en-US" sz="2400" dirty="0"/>
-              <a:t>GFE Bundle</a:t>
-            </a:r>
-          </a:p>
-        </p:txBody>
-      </p:sp>
-      <p:sp>
-        <p:nvSpPr>
-          <p:cNvPr id="14" name="TextBox 13">
-            <a:extLst>
-              <a:ext uri="{FF2B5EF4-FFF2-40B4-BE49-F238E27FC236}">
-                <a16:creationId xmlns:a16="http://schemas.microsoft.com/office/drawing/2014/main" id="{1EE320BA-224E-9E4D-B80B-99AB3D54D2D2}"/>
-              </a:ext>
-            </a:extLst>
-          </p:cNvPr>
-          <p:cNvSpPr txBox="1"/>
+            <a:pPr algn="ctr"/>
+            <a:r>
+              <a:rPr lang="en-US" sz="1400" dirty="0"/>
+              <a:t>PCT Good Faith Estimates (GFE) (1..*)</a:t>
+            </a:r>
+          </a:p>
+        </p:txBody>
+      </p:sp>
+      <p:sp>
+        <p:nvSpPr>
+          <p:cNvPr id="24" name="Alternate Process 23">
+            <a:extLst>
+              <a:ext uri="{FF2B5EF4-FFF2-40B4-BE49-F238E27FC236}">
+                <a16:creationId xmlns:a16="http://schemas.microsoft.com/office/drawing/2014/main" id="{95F71CA7-EBF9-BF48-87C0-4938B787499E}"/>
+              </a:ext>
+            </a:extLst>
+          </p:cNvPr>
+          <p:cNvSpPr/>
           <p:nvPr/>
         </p:nvSpPr>
         <p:spPr>
           <a:xfrm>
-            <a:off x="7556136" y="893628"/>
-            <a:ext cx="1924231" cy="461665"/>
-          </a:xfrm>
-          <a:prstGeom prst="rect">
-            <a:avLst/>
-          </a:prstGeom>
-          <a:noFill/>
-        </p:spPr>
-        <p:txBody>
-          <a:bodyPr wrap="square" rtlCol="0">
-            <a:spAutoFit/>
-          </a:bodyPr>
-          <a:lstStyle/>
-          <a:p>
-            <a:r>
-              <a:rPr lang="en-US" sz="2400" dirty="0"/>
-              <a:t>AEOB Bundle</a:t>
-            </a:r>
-          </a:p>
-        </p:txBody>
-      </p:sp>
-      <p:sp>
-        <p:nvSpPr>
-          <p:cNvPr id="26" name="Alternate Process 25">
-            <a:extLst>
-              <a:ext uri="{FF2B5EF4-FFF2-40B4-BE49-F238E27FC236}">
-                <a16:creationId xmlns:a16="http://schemas.microsoft.com/office/drawing/2014/main" id="{62098F33-DC2E-D74C-82F7-E174A1199AD6}"/>
-              </a:ext>
-            </a:extLst>
-          </p:cNvPr>
-          <p:cNvSpPr/>
-          <p:nvPr/>
-        </p:nvSpPr>
-        <p:spPr>
-          <a:xfrm>
-            <a:off x="6556373" y="1353460"/>
-            <a:ext cx="4044136" cy="4124703"/>
+            <a:off x="1135363" y="1415806"/>
+            <a:ext cx="1501553" cy="421278"/>
           </a:xfrm>
           <a:prstGeom prst="flowChartAlternateProcess">
             <a:avLst/>
           </a:prstGeom>
+          <a:solidFill>
+            <a:schemeClr val="accent6">
+              <a:lumMod val="60000"/>
+              <a:lumOff val="40000"/>
+            </a:schemeClr>
+          </a:solidFill>
         </p:spPr>
         <p:style>
           <a:lnRef idx="2">
@@ -3580,9 +4360,788 @@
           <a:p>
             <a:pPr algn="ctr"/>
             <a:r>
-              <a:rPr lang="en-US" sz="2000" dirty="0"/>
-              <a:t>PCTAdvancedEOB (1..1)</a:t>
-            </a:r>
+              <a:rPr lang="en-US" sz="1400" dirty="0"/>
+              <a:t>PCT Patient</a:t>
+            </a:r>
+          </a:p>
+        </p:txBody>
+      </p:sp>
+      <p:sp>
+        <p:nvSpPr>
+          <p:cNvPr id="25" name="Alternate Process 24">
+            <a:extLst>
+              <a:ext uri="{FF2B5EF4-FFF2-40B4-BE49-F238E27FC236}">
+                <a16:creationId xmlns:a16="http://schemas.microsoft.com/office/drawing/2014/main" id="{E511FC81-8DDA-B64A-9B60-495058D9B329}"/>
+              </a:ext>
+            </a:extLst>
+          </p:cNvPr>
+          <p:cNvSpPr/>
+          <p:nvPr/>
+        </p:nvSpPr>
+        <p:spPr>
+          <a:xfrm>
+            <a:off x="2667461" y="1415497"/>
+            <a:ext cx="1477904" cy="421278"/>
+          </a:xfrm>
+          <a:prstGeom prst="flowChartAlternateProcess">
+            <a:avLst/>
+          </a:prstGeom>
+          <a:solidFill>
+            <a:schemeClr val="accent6">
+              <a:lumMod val="60000"/>
+              <a:lumOff val="40000"/>
+            </a:schemeClr>
+          </a:solidFill>
+        </p:spPr>
+        <p:style>
+          <a:lnRef idx="2">
+            <a:schemeClr val="accent2">
+              <a:shade val="50000"/>
+            </a:schemeClr>
+          </a:lnRef>
+          <a:fillRef idx="1">
+            <a:schemeClr val="accent2"/>
+          </a:fillRef>
+          <a:effectRef idx="0">
+            <a:schemeClr val="accent2"/>
+          </a:effectRef>
+          <a:fontRef idx="minor">
+            <a:schemeClr val="lt1"/>
+          </a:fontRef>
+        </p:style>
+        <p:txBody>
+          <a:bodyPr rtlCol="0" anchor="ctr"/>
+          <a:lstStyle/>
+          <a:p>
+            <a:pPr algn="ctr"/>
+            <a:r>
+              <a:rPr lang="en-US" sz="1400" dirty="0"/>
+              <a:t>PCT Organization (Provider)</a:t>
+            </a:r>
+          </a:p>
+        </p:txBody>
+      </p:sp>
+      <p:sp>
+        <p:nvSpPr>
+          <p:cNvPr id="27" name="Alternate Process 26">
+            <a:extLst>
+              <a:ext uri="{FF2B5EF4-FFF2-40B4-BE49-F238E27FC236}">
+                <a16:creationId xmlns:a16="http://schemas.microsoft.com/office/drawing/2014/main" id="{E03FC197-DADD-E148-9370-6BCE3F29DDFD}"/>
+              </a:ext>
+            </a:extLst>
+          </p:cNvPr>
+          <p:cNvSpPr/>
+          <p:nvPr/>
+        </p:nvSpPr>
+        <p:spPr>
+          <a:xfrm>
+            <a:off x="1136651" y="1844802"/>
+            <a:ext cx="1501553" cy="421278"/>
+          </a:xfrm>
+          <a:prstGeom prst="flowChartAlternateProcess">
+            <a:avLst/>
+          </a:prstGeom>
+          <a:solidFill>
+            <a:schemeClr val="accent6">
+              <a:lumMod val="60000"/>
+              <a:lumOff val="40000"/>
+            </a:schemeClr>
+          </a:solidFill>
+        </p:spPr>
+        <p:style>
+          <a:lnRef idx="2">
+            <a:schemeClr val="accent2">
+              <a:shade val="50000"/>
+            </a:schemeClr>
+          </a:lnRef>
+          <a:fillRef idx="1">
+            <a:schemeClr val="accent2"/>
+          </a:fillRef>
+          <a:effectRef idx="0">
+            <a:schemeClr val="accent2"/>
+          </a:effectRef>
+          <a:fontRef idx="minor">
+            <a:schemeClr val="lt1"/>
+          </a:fontRef>
+        </p:style>
+        <p:txBody>
+          <a:bodyPr rtlCol="0" anchor="ctr"/>
+          <a:lstStyle/>
+          <a:p>
+            <a:pPr algn="ctr"/>
+            <a:r>
+              <a:rPr lang="en-US" sz="1400" dirty="0"/>
+              <a:t>PCT PractitionerRole</a:t>
+            </a:r>
+          </a:p>
+        </p:txBody>
+      </p:sp>
+      <p:sp>
+        <p:nvSpPr>
+          <p:cNvPr id="28" name="Alternate Process 27">
+            <a:extLst>
+              <a:ext uri="{FF2B5EF4-FFF2-40B4-BE49-F238E27FC236}">
+                <a16:creationId xmlns:a16="http://schemas.microsoft.com/office/drawing/2014/main" id="{78ED372A-567D-AF45-8816-B6BFDBC73CD2}"/>
+              </a:ext>
+            </a:extLst>
+          </p:cNvPr>
+          <p:cNvSpPr/>
+          <p:nvPr/>
+        </p:nvSpPr>
+        <p:spPr>
+          <a:xfrm>
+            <a:off x="4167626" y="1401039"/>
+            <a:ext cx="1477904" cy="453006"/>
+          </a:xfrm>
+          <a:prstGeom prst="flowChartAlternateProcess">
+            <a:avLst/>
+          </a:prstGeom>
+          <a:solidFill>
+            <a:schemeClr val="accent6">
+              <a:lumMod val="60000"/>
+              <a:lumOff val="40000"/>
+            </a:schemeClr>
+          </a:solidFill>
+        </p:spPr>
+        <p:style>
+          <a:lnRef idx="2">
+            <a:schemeClr val="accent2">
+              <a:shade val="50000"/>
+            </a:schemeClr>
+          </a:lnRef>
+          <a:fillRef idx="1">
+            <a:schemeClr val="accent2"/>
+          </a:fillRef>
+          <a:effectRef idx="0">
+            <a:schemeClr val="accent2"/>
+          </a:effectRef>
+          <a:fontRef idx="minor">
+            <a:schemeClr val="lt1"/>
+          </a:fontRef>
+        </p:style>
+        <p:txBody>
+          <a:bodyPr rtlCol="0" anchor="ctr"/>
+          <a:lstStyle/>
+          <a:p>
+            <a:pPr algn="ctr"/>
+            <a:r>
+              <a:rPr lang="en-US" sz="1400" dirty="0"/>
+              <a:t>PCT Organization (Payer)</a:t>
+            </a:r>
+          </a:p>
+        </p:txBody>
+      </p:sp>
+      <p:sp>
+        <p:nvSpPr>
+          <p:cNvPr id="29" name="Alternate Process 28">
+            <a:extLst>
+              <a:ext uri="{FF2B5EF4-FFF2-40B4-BE49-F238E27FC236}">
+                <a16:creationId xmlns:a16="http://schemas.microsoft.com/office/drawing/2014/main" id="{1CB9098F-47B5-3840-8164-38C8A743020C}"/>
+              </a:ext>
+            </a:extLst>
+          </p:cNvPr>
+          <p:cNvSpPr/>
+          <p:nvPr/>
+        </p:nvSpPr>
+        <p:spPr>
+          <a:xfrm>
+            <a:off x="2667461" y="1856547"/>
+            <a:ext cx="1476834" cy="421279"/>
+          </a:xfrm>
+          <a:prstGeom prst="flowChartAlternateProcess">
+            <a:avLst/>
+          </a:prstGeom>
+          <a:solidFill>
+            <a:schemeClr val="accent6">
+              <a:lumMod val="60000"/>
+              <a:lumOff val="40000"/>
+            </a:schemeClr>
+          </a:solidFill>
+        </p:spPr>
+        <p:style>
+          <a:lnRef idx="2">
+            <a:schemeClr val="accent2">
+              <a:shade val="50000"/>
+            </a:schemeClr>
+          </a:lnRef>
+          <a:fillRef idx="1">
+            <a:schemeClr val="accent2"/>
+          </a:fillRef>
+          <a:effectRef idx="0">
+            <a:schemeClr val="accent2"/>
+          </a:effectRef>
+          <a:fontRef idx="minor">
+            <a:schemeClr val="lt1"/>
+          </a:fontRef>
+        </p:style>
+        <p:txBody>
+          <a:bodyPr rtlCol="0" anchor="ctr"/>
+          <a:lstStyle/>
+          <a:p>
+            <a:pPr algn="ctr"/>
+            <a:r>
+              <a:rPr lang="en-US" sz="1400" dirty="0"/>
+              <a:t>PCT Location</a:t>
+            </a:r>
+          </a:p>
+        </p:txBody>
+      </p:sp>
+      <p:sp>
+        <p:nvSpPr>
+          <p:cNvPr id="30" name="Alternate Process 29">
+            <a:extLst>
+              <a:ext uri="{FF2B5EF4-FFF2-40B4-BE49-F238E27FC236}">
+                <a16:creationId xmlns:a16="http://schemas.microsoft.com/office/drawing/2014/main" id="{8FA9FCF2-8E66-2A44-B5FB-4B538C6F3E56}"/>
+              </a:ext>
+            </a:extLst>
+          </p:cNvPr>
+          <p:cNvSpPr/>
+          <p:nvPr/>
+        </p:nvSpPr>
+        <p:spPr>
+          <a:xfrm>
+            <a:off x="4167626" y="1863777"/>
+            <a:ext cx="1476834" cy="431075"/>
+          </a:xfrm>
+          <a:prstGeom prst="flowChartAlternateProcess">
+            <a:avLst/>
+          </a:prstGeom>
+          <a:solidFill>
+            <a:schemeClr val="accent6">
+              <a:lumMod val="60000"/>
+              <a:lumOff val="40000"/>
+            </a:schemeClr>
+          </a:solidFill>
+        </p:spPr>
+        <p:style>
+          <a:lnRef idx="2">
+            <a:schemeClr val="accent2">
+              <a:shade val="50000"/>
+            </a:schemeClr>
+          </a:lnRef>
+          <a:fillRef idx="1">
+            <a:schemeClr val="accent2"/>
+          </a:fillRef>
+          <a:effectRef idx="0">
+            <a:schemeClr val="accent2"/>
+          </a:effectRef>
+          <a:fontRef idx="minor">
+            <a:schemeClr val="lt1"/>
+          </a:fontRef>
+        </p:style>
+        <p:txBody>
+          <a:bodyPr rtlCol="0" anchor="ctr"/>
+          <a:lstStyle/>
+          <a:p>
+            <a:pPr algn="ctr"/>
+            <a:r>
+              <a:rPr lang="en-US" sz="1400" dirty="0"/>
+              <a:t>PCT Practitioner</a:t>
+            </a:r>
+          </a:p>
+        </p:txBody>
+      </p:sp>
+      <p:sp>
+        <p:nvSpPr>
+          <p:cNvPr id="31" name="Alternate Process 30">
+            <a:extLst>
+              <a:ext uri="{FF2B5EF4-FFF2-40B4-BE49-F238E27FC236}">
+                <a16:creationId xmlns:a16="http://schemas.microsoft.com/office/drawing/2014/main" id="{36041D3F-BD42-E644-8DE7-A548BFEE6A28}"/>
+              </a:ext>
+            </a:extLst>
+          </p:cNvPr>
+          <p:cNvSpPr/>
+          <p:nvPr/>
+        </p:nvSpPr>
+        <p:spPr>
+          <a:xfrm>
+            <a:off x="2667461" y="2297318"/>
+            <a:ext cx="1477904" cy="456351"/>
+          </a:xfrm>
+          <a:prstGeom prst="flowChartAlternateProcess">
+            <a:avLst/>
+          </a:prstGeom>
+          <a:solidFill>
+            <a:schemeClr val="accent6">
+              <a:lumMod val="60000"/>
+              <a:lumOff val="40000"/>
+            </a:schemeClr>
+          </a:solidFill>
+        </p:spPr>
+        <p:style>
+          <a:lnRef idx="2">
+            <a:schemeClr val="accent2">
+              <a:shade val="50000"/>
+            </a:schemeClr>
+          </a:lnRef>
+          <a:fillRef idx="1">
+            <a:schemeClr val="accent2"/>
+          </a:fillRef>
+          <a:effectRef idx="0">
+            <a:schemeClr val="accent2"/>
+          </a:effectRef>
+          <a:fontRef idx="minor">
+            <a:schemeClr val="lt1"/>
+          </a:fontRef>
+        </p:style>
+        <p:txBody>
+          <a:bodyPr rtlCol="0" anchor="ctr"/>
+          <a:lstStyle/>
+          <a:p>
+            <a:pPr algn="ctr"/>
+            <a:r>
+              <a:rPr lang="en-US" sz="1400" dirty="0"/>
+              <a:t>PCT Coverage</a:t>
+            </a:r>
+          </a:p>
+        </p:txBody>
+      </p:sp>
+      <p:sp>
+        <p:nvSpPr>
+          <p:cNvPr id="33" name="Alternate Process 32">
+            <a:extLst>
+              <a:ext uri="{FF2B5EF4-FFF2-40B4-BE49-F238E27FC236}">
+                <a16:creationId xmlns:a16="http://schemas.microsoft.com/office/drawing/2014/main" id="{D094F4DB-F4BC-B642-921F-1C6962ADBB1C}"/>
+              </a:ext>
+            </a:extLst>
+          </p:cNvPr>
+          <p:cNvSpPr/>
+          <p:nvPr/>
+        </p:nvSpPr>
+        <p:spPr>
+          <a:xfrm>
+            <a:off x="6754866" y="2772801"/>
+            <a:ext cx="4637112" cy="2192787"/>
+          </a:xfrm>
+          <a:prstGeom prst="flowChartAlternateProcess">
+            <a:avLst/>
+          </a:prstGeom>
+          <a:solidFill>
+            <a:schemeClr val="accent6">
+              <a:lumMod val="75000"/>
+            </a:schemeClr>
+          </a:solidFill>
+        </p:spPr>
+        <p:style>
+          <a:lnRef idx="2">
+            <a:schemeClr val="accent2">
+              <a:shade val="50000"/>
+            </a:schemeClr>
+          </a:lnRef>
+          <a:fillRef idx="1">
+            <a:schemeClr val="accent2"/>
+          </a:fillRef>
+          <a:effectRef idx="0">
+            <a:schemeClr val="accent2"/>
+          </a:effectRef>
+          <a:fontRef idx="minor">
+            <a:schemeClr val="lt1"/>
+          </a:fontRef>
+        </p:style>
+        <p:txBody>
+          <a:bodyPr rtlCol="0" anchor="ctr"/>
+          <a:lstStyle/>
+          <a:p>
+            <a:r>
+              <a:rPr lang="en-US" sz="1400" dirty="0"/>
+              <a:t>Extensions for:</a:t>
+            </a:r>
+          </a:p>
+          <a:p>
+            <a:pPr marL="171450" indent="-171450">
+              <a:buFont typeface="Arial" panose="020B0604020202020204" pitchFamily="34" charset="0"/>
+              <a:buChar char="•"/>
+            </a:pPr>
+            <a:r>
+              <a:rPr lang="en-US" sz="1400" dirty="0"/>
+              <a:t>Reference one or more GFEs </a:t>
+            </a:r>
+          </a:p>
+          <a:p>
+            <a:pPr marL="171450" indent="-171450">
+              <a:buFont typeface="Arial" panose="020B0604020202020204" pitchFamily="34" charset="0"/>
+              <a:buChar char="•"/>
+            </a:pPr>
+            <a:r>
+              <a:rPr lang="en-US" sz="1400" dirty="0"/>
+              <a:t>Disclaimer </a:t>
+            </a:r>
+          </a:p>
+          <a:p>
+            <a:pPr marL="171450" indent="-171450">
+              <a:buFont typeface="Arial" panose="020B0604020202020204" pitchFamily="34" charset="0"/>
+              <a:buChar char="•"/>
+            </a:pPr>
+            <a:r>
+              <a:rPr lang="en-US" sz="1400" dirty="0"/>
+              <a:t>Expiration Date </a:t>
+            </a:r>
+          </a:p>
+          <a:p>
+            <a:pPr marL="171450" indent="-171450">
+              <a:buFont typeface="Arial" panose="020B0604020202020204" pitchFamily="34" charset="0"/>
+              <a:buChar char="•"/>
+            </a:pPr>
+            <a:r>
+              <a:rPr lang="en-US" sz="1400" dirty="0"/>
+              <a:t>Out of Network Provider Info </a:t>
+            </a:r>
+          </a:p>
+          <a:p>
+            <a:pPr marL="171450" indent="-171450">
+              <a:buFont typeface="Arial" panose="020B0604020202020204" pitchFamily="34" charset="0"/>
+              <a:buChar char="•"/>
+            </a:pPr>
+            <a:r>
+              <a:rPr lang="en-US" sz="1400" dirty="0"/>
+              <a:t>Date of Service </a:t>
+            </a:r>
+          </a:p>
+          <a:p>
+            <a:pPr marL="171450" indent="-171450">
+              <a:buFont typeface="Arial" panose="020B0604020202020204" pitchFamily="34" charset="0"/>
+              <a:buChar char="•"/>
+            </a:pPr>
+            <a:r>
+              <a:rPr lang="en-US" sz="1400" dirty="0"/>
+              <a:t>Subject to Medical Management</a:t>
+            </a:r>
+          </a:p>
+        </p:txBody>
+      </p:sp>
+      <p:sp>
+        <p:nvSpPr>
+          <p:cNvPr id="37" name="Alternate Process 36">
+            <a:extLst>
+              <a:ext uri="{FF2B5EF4-FFF2-40B4-BE49-F238E27FC236}">
+                <a16:creationId xmlns:a16="http://schemas.microsoft.com/office/drawing/2014/main" id="{A66C836D-9A7F-4143-90D3-4C265BC06AB8}"/>
+              </a:ext>
+            </a:extLst>
+          </p:cNvPr>
+          <p:cNvSpPr/>
+          <p:nvPr/>
+        </p:nvSpPr>
+        <p:spPr>
+          <a:xfrm>
+            <a:off x="1148100" y="2772801"/>
+            <a:ext cx="4635509" cy="2192787"/>
+          </a:xfrm>
+          <a:prstGeom prst="flowChartAlternateProcess">
+            <a:avLst/>
+          </a:prstGeom>
+          <a:solidFill>
+            <a:schemeClr val="accent6">
+              <a:lumMod val="75000"/>
+            </a:schemeClr>
+          </a:solidFill>
+        </p:spPr>
+        <p:style>
+          <a:lnRef idx="2">
+            <a:schemeClr val="accent2">
+              <a:shade val="50000"/>
+            </a:schemeClr>
+          </a:lnRef>
+          <a:fillRef idx="1">
+            <a:schemeClr val="accent2"/>
+          </a:fillRef>
+          <a:effectRef idx="0">
+            <a:schemeClr val="accent2"/>
+          </a:effectRef>
+          <a:fontRef idx="minor">
+            <a:schemeClr val="lt1"/>
+          </a:fontRef>
+        </p:style>
+        <p:txBody>
+          <a:bodyPr rtlCol="0" anchor="ctr"/>
+          <a:lstStyle/>
+          <a:p>
+            <a:r>
+              <a:rPr lang="en-US" sz="1400" dirty="0"/>
+              <a:t>Extensions for:</a:t>
+            </a:r>
+          </a:p>
+          <a:p>
+            <a:pPr marL="171450" indent="-171450">
+              <a:buFont typeface="Arial" panose="020B0604020202020204" pitchFamily="34" charset="0"/>
+              <a:buChar char="•"/>
+            </a:pPr>
+            <a:r>
+              <a:rPr lang="en-US" sz="1400" dirty="0"/>
+              <a:t>Submitter </a:t>
+            </a:r>
+          </a:p>
+          <a:p>
+            <a:pPr marL="171450" indent="-171450">
+              <a:buFont typeface="Arial" panose="020B0604020202020204" pitchFamily="34" charset="0"/>
+              <a:buChar char="•"/>
+            </a:pPr>
+            <a:r>
+              <a:rPr lang="en-US" sz="1400" dirty="0"/>
+              <a:t>Assigned Service Identifier </a:t>
+            </a:r>
+          </a:p>
+          <a:p>
+            <a:pPr marL="171450" indent="-171450">
+              <a:buFont typeface="Arial" panose="020B0604020202020204" pitchFamily="34" charset="0"/>
+              <a:buChar char="•"/>
+            </a:pPr>
+            <a:r>
+              <a:rPr lang="en-US" sz="1400" dirty="0"/>
+              <a:t>Service Linking Info </a:t>
+            </a:r>
+          </a:p>
+          <a:p>
+            <a:pPr marL="171450" indent="-171450">
+              <a:buFont typeface="Arial" panose="020B0604020202020204" pitchFamily="34" charset="0"/>
+              <a:buChar char="•"/>
+            </a:pPr>
+            <a:r>
+              <a:rPr lang="en-US" sz="1400" dirty="0"/>
+              <a:t>Referral Number </a:t>
+            </a:r>
+          </a:p>
+          <a:p>
+            <a:pPr marL="171450" indent="-171450">
+              <a:buFont typeface="Arial" panose="020B0604020202020204" pitchFamily="34" charset="0"/>
+              <a:buChar char="•"/>
+            </a:pPr>
+            <a:r>
+              <a:rPr lang="en-US" sz="1400" dirty="0"/>
+              <a:t>Provider Event Methodology </a:t>
+            </a:r>
+          </a:p>
+          <a:p>
+            <a:pPr marL="171450" indent="-171450">
+              <a:buFont typeface="Arial" panose="020B0604020202020204" pitchFamily="34" charset="0"/>
+              <a:buChar char="•"/>
+            </a:pPr>
+            <a:r>
+              <a:rPr lang="en-US" sz="1400" dirty="0"/>
+              <a:t>InterTransIdentifier</a:t>
+            </a:r>
+          </a:p>
+          <a:p>
+            <a:pPr marL="171450" indent="-171450">
+              <a:buFont typeface="Arial" panose="020B0604020202020204" pitchFamily="34" charset="0"/>
+              <a:buChar char="•"/>
+            </a:pPr>
+            <a:r>
+              <a:rPr lang="en-US" sz="1400" dirty="0"/>
+              <a:t>Estimated Date of Service</a:t>
+            </a:r>
+          </a:p>
+          <a:p>
+            <a:pPr marL="171450" indent="-171450">
+              <a:buFont typeface="Arial" panose="020B0604020202020204" pitchFamily="34" charset="0"/>
+              <a:buChar char="•"/>
+            </a:pPr>
+            <a:r>
+              <a:rPr lang="en-US" sz="1400" dirty="0"/>
+              <a:t>Billing Provider Line-Item Control Number</a:t>
+            </a:r>
+          </a:p>
+          <a:p>
+            <a:pPr marL="171450" indent="-171450">
+              <a:buFont typeface="Arial" panose="020B0604020202020204" pitchFamily="34" charset="0"/>
+              <a:buChar char="•"/>
+            </a:pPr>
+            <a:r>
+              <a:rPr lang="en-US" sz="1400" dirty="0"/>
+              <a:t>Compound Drug Linking Number</a:t>
+            </a:r>
+          </a:p>
+        </p:txBody>
+      </p:sp>
+      <p:sp>
+        <p:nvSpPr>
+          <p:cNvPr id="38" name="Alternate Process 37">
+            <a:extLst>
+              <a:ext uri="{FF2B5EF4-FFF2-40B4-BE49-F238E27FC236}">
+                <a16:creationId xmlns:a16="http://schemas.microsoft.com/office/drawing/2014/main" id="{C3E8866A-1C70-3247-88DC-1EBCCE4F6B02}"/>
+              </a:ext>
+            </a:extLst>
+          </p:cNvPr>
+          <p:cNvSpPr/>
+          <p:nvPr/>
+        </p:nvSpPr>
+        <p:spPr>
+          <a:xfrm>
+            <a:off x="1431169" y="4982858"/>
+            <a:ext cx="4045248" cy="1601305"/>
+          </a:xfrm>
+          <a:prstGeom prst="flowChartAlternateProcess">
+            <a:avLst/>
+          </a:prstGeom>
+          <a:solidFill>
+            <a:srgbClr val="FFC000"/>
+          </a:solidFill>
+        </p:spPr>
+        <p:style>
+          <a:lnRef idx="2">
+            <a:schemeClr val="accent2">
+              <a:shade val="50000"/>
+            </a:schemeClr>
+          </a:lnRef>
+          <a:fillRef idx="1">
+            <a:schemeClr val="accent2"/>
+          </a:fillRef>
+          <a:effectRef idx="0">
+            <a:schemeClr val="accent2"/>
+          </a:effectRef>
+          <a:fontRef idx="minor">
+            <a:schemeClr val="lt1"/>
+          </a:fontRef>
+        </p:style>
+        <p:txBody>
+          <a:bodyPr rtlCol="0" anchor="ctr"/>
+          <a:lstStyle/>
+          <a:p>
+            <a:r>
+              <a:rPr lang="en-US" sz="1400" dirty="0"/>
+              <a:t>Slices for:</a:t>
+            </a:r>
+          </a:p>
+          <a:p>
+            <a:pPr marL="171450" indent="-171450">
+              <a:buFont typeface="Arial" panose="020B0604020202020204" pitchFamily="34" charset="0"/>
+              <a:buChar char="•"/>
+            </a:pPr>
+            <a:r>
+              <a:rPr lang="en-US" sz="1400" dirty="0"/>
+              <a:t>Claim.supportingInfo is sliced based on the value of pattern:category</a:t>
+            </a:r>
+          </a:p>
+          <a:p>
+            <a:pPr marL="171450" indent="-171450">
+              <a:buFont typeface="Arial" panose="020B0604020202020204" pitchFamily="34" charset="0"/>
+              <a:buChar char="•"/>
+            </a:pPr>
+            <a:r>
+              <a:rPr lang="en-US" sz="1400" dirty="0"/>
+              <a:t>Claim.diagnosis is sliced based on the value of pattern:type</a:t>
+            </a:r>
+          </a:p>
+          <a:p>
+            <a:pPr marL="171450" indent="-171450">
+              <a:buFont typeface="Arial" panose="020B0604020202020204" pitchFamily="34" charset="0"/>
+              <a:buChar char="•"/>
+            </a:pPr>
+            <a:r>
+              <a:rPr lang="en-US" sz="1400" dirty="0"/>
+              <a:t>Claim.procedure is sliced based on the value of pattern:type</a:t>
+            </a:r>
+          </a:p>
+        </p:txBody>
+      </p:sp>
+      <p:sp>
+        <p:nvSpPr>
+          <p:cNvPr id="46" name="TextBox 45">
+            <a:extLst>
+              <a:ext uri="{FF2B5EF4-FFF2-40B4-BE49-F238E27FC236}">
+                <a16:creationId xmlns:a16="http://schemas.microsoft.com/office/drawing/2014/main" id="{AAE39ED2-B91A-344D-8681-A4F6A682591F}"/>
+              </a:ext>
+            </a:extLst>
+          </p:cNvPr>
+          <p:cNvSpPr txBox="1"/>
+          <p:nvPr/>
+        </p:nvSpPr>
+        <p:spPr>
+          <a:xfrm>
+            <a:off x="2277845" y="850835"/>
+            <a:ext cx="2221102" cy="523220"/>
+          </a:xfrm>
+          <a:prstGeom prst="rect">
+            <a:avLst/>
+          </a:prstGeom>
+          <a:solidFill>
+            <a:schemeClr val="tx2">
+              <a:lumMod val="40000"/>
+              <a:lumOff val="60000"/>
+            </a:schemeClr>
+          </a:solidFill>
+        </p:spPr>
+        <p:txBody>
+          <a:bodyPr wrap="square">
+            <a:spAutoFit/>
+          </a:bodyPr>
+          <a:lstStyle/>
+          <a:p>
+            <a:r>
+              <a:rPr lang="en-US" sz="1400" dirty="0">
+                <a:solidFill>
+                  <a:srgbClr val="333333"/>
+                </a:solidFill>
+              </a:rPr>
+              <a:t>Mandatory: 9 elements</a:t>
+            </a:r>
+            <a:br>
+              <a:rPr lang="en-US" sz="1400" dirty="0"/>
+            </a:br>
+            <a:r>
+              <a:rPr lang="en-US" sz="1400" dirty="0">
+                <a:solidFill>
+                  <a:srgbClr val="333333"/>
+                </a:solidFill>
+              </a:rPr>
+              <a:t>Must-Support: 41 elements</a:t>
+            </a:r>
+            <a:endParaRPr lang="en-US" sz="1400" dirty="0"/>
+          </a:p>
+        </p:txBody>
+      </p:sp>
+      <p:sp>
+        <p:nvSpPr>
+          <p:cNvPr id="47" name="TextBox 46">
+            <a:extLst>
+              <a:ext uri="{FF2B5EF4-FFF2-40B4-BE49-F238E27FC236}">
+                <a16:creationId xmlns:a16="http://schemas.microsoft.com/office/drawing/2014/main" id="{FA156A6E-E083-3A4A-AE8F-DAA66087FAD3}"/>
+              </a:ext>
+            </a:extLst>
+          </p:cNvPr>
+          <p:cNvSpPr txBox="1"/>
+          <p:nvPr/>
+        </p:nvSpPr>
+        <p:spPr>
+          <a:xfrm>
+            <a:off x="7951376" y="827548"/>
+            <a:ext cx="2242432" cy="523220"/>
+          </a:xfrm>
+          <a:prstGeom prst="rect">
+            <a:avLst/>
+          </a:prstGeom>
+          <a:solidFill>
+            <a:schemeClr val="tx2">
+              <a:lumMod val="40000"/>
+              <a:lumOff val="60000"/>
+            </a:schemeClr>
+          </a:solidFill>
+        </p:spPr>
+        <p:txBody>
+          <a:bodyPr wrap="square">
+            <a:spAutoFit/>
+          </a:bodyPr>
+          <a:lstStyle/>
+          <a:p>
+            <a:r>
+              <a:rPr lang="en-US" sz="1400" dirty="0">
+                <a:solidFill>
+                  <a:srgbClr val="333333"/>
+                </a:solidFill>
+              </a:rPr>
+              <a:t>Mandatory: 9 elements</a:t>
+            </a:r>
+            <a:br>
+              <a:rPr lang="en-US" sz="1400" dirty="0"/>
+            </a:br>
+            <a:r>
+              <a:rPr lang="en-US" sz="1400" dirty="0">
+                <a:solidFill>
+                  <a:srgbClr val="333333"/>
+                </a:solidFill>
+              </a:rPr>
+              <a:t>Must-Support: 15 elements</a:t>
+            </a:r>
+            <a:endParaRPr lang="en-US" sz="1400" dirty="0"/>
           </a:p>
         </p:txBody>
       </p:sp>
@@ -3892,4 +5451,299 @@
     </a:ext>
   </a:extLst>
 </a:theme>
+</file>
+
+<file path=ppt/theme/theme2.xml><?xml version="1.0" encoding="utf-8"?>
+<a:theme xmlns:a="http://schemas.openxmlformats.org/drawingml/2006/main" name="Office Theme">
+  <a:themeElements>
+    <a:clrScheme name="Office">
+      <a:dk1>
+        <a:sysClr val="windowText" lastClr="000000"/>
+      </a:dk1>
+      <a:lt1>
+        <a:sysClr val="window" lastClr="FFFFFF"/>
+      </a:lt1>
+      <a:dk2>
+        <a:srgbClr val="44546A"/>
+      </a:dk2>
+      <a:lt2>
+        <a:srgbClr val="E7E6E6"/>
+      </a:lt2>
+      <a:accent1>
+        <a:srgbClr val="4472C4"/>
+      </a:accent1>
+      <a:accent2>
+        <a:srgbClr val="ED7D31"/>
+      </a:accent2>
+      <a:accent3>
+        <a:srgbClr val="A5A5A5"/>
+      </a:accent3>
+      <a:accent4>
+        <a:srgbClr val="FFC000"/>
+      </a:accent4>
+      <a:accent5>
+        <a:srgbClr val="5B9BD5"/>
+      </a:accent5>
+      <a:accent6>
+        <a:srgbClr val="70AD47"/>
+      </a:accent6>
+      <a:hlink>
+        <a:srgbClr val="0563C1"/>
+      </a:hlink>
+      <a:folHlink>
+        <a:srgbClr val="954F72"/>
+      </a:folHlink>
+    </a:clrScheme>
+    <a:fontScheme name="Office">
+      <a:majorFont>
+        <a:latin typeface="Calibri Light" panose="020F0302020204030204"/>
+        <a:ea typeface=""/>
+        <a:cs typeface=""/>
+        <a:font script="Jpan" typeface="游ゴシック Light"/>
+        <a:font script="Hang" typeface="맑은 고딕"/>
+        <a:font script="Hans" typeface="等线 Light"/>
+        <a:font script="Hant" typeface="新細明體"/>
+        <a:font script="Arab" typeface="Times New Roman"/>
+        <a:font script="Hebr" typeface="Times New Roman"/>
+        <a:font script="Thai" typeface="Angsana New"/>
+        <a:font script="Ethi" typeface="Nyala"/>
+        <a:font script="Beng" typeface="Vrinda"/>
+        <a:font script="Gujr" typeface="Shruti"/>
+        <a:font script="Khmr" typeface="MoolBoran"/>
+        <a:font script="Knda" typeface="Tunga"/>
+        <a:font script="Guru" typeface="Raavi"/>
+        <a:font script="Cans" typeface="Euphemia"/>
+        <a:font script="Cher" typeface="Plantagenet Cherokee"/>
+        <a:font script="Yiii" typeface="Microsoft Yi Baiti"/>
+        <a:font script="Tibt" typeface="Microsoft Himalaya"/>
+        <a:font script="Thaa" typeface="MV Boli"/>
+        <a:font script="Deva" typeface="Mangal"/>
+        <a:font script="Telu" typeface="Gautami"/>
+        <a:font script="Taml" typeface="Latha"/>
+        <a:font script="Syrc" typeface="Estrangelo Edessa"/>
+        <a:font script="Orya" typeface="Kalinga"/>
+        <a:font script="Mlym" typeface="Kartika"/>
+        <a:font script="Laoo" typeface="DokChampa"/>
+        <a:font script="Sinh" typeface="Iskoola Pota"/>
+        <a:font script="Mong" typeface="Mongolian Baiti"/>
+        <a:font script="Viet" typeface="Times New Roman"/>
+        <a:font script="Uigh" typeface="Microsoft Uighur"/>
+        <a:font script="Geor" typeface="Sylfaen"/>
+        <a:font script="Armn" typeface="Arial"/>
+        <a:font script="Bugi" typeface="Leelawadee UI"/>
+        <a:font script="Bopo" typeface="Microsoft JhengHei"/>
+        <a:font script="Java" typeface="Javanese Text"/>
+        <a:font script="Lisu" typeface="Segoe UI"/>
+        <a:font script="Mymr" typeface="Myanmar Text"/>
+        <a:font script="Nkoo" typeface="Ebrima"/>
+        <a:font script="Olck" typeface="Nirmala UI"/>
+        <a:font script="Osma" typeface="Ebrima"/>
+        <a:font script="Phag" typeface="Phagspa"/>
+        <a:font script="Syrn" typeface="Estrangelo Edessa"/>
+        <a:font script="Syrj" typeface="Estrangelo Edessa"/>
+        <a:font script="Syre" typeface="Estrangelo Edessa"/>
+        <a:font script="Sora" typeface="Nirmala UI"/>
+        <a:font script="Tale" typeface="Microsoft Tai Le"/>
+        <a:font script="Talu" typeface="Microsoft New Tai Lue"/>
+        <a:font script="Tfng" typeface="Ebrima"/>
+      </a:majorFont>
+      <a:minorFont>
+        <a:latin typeface="Calibri" panose="020F0502020204030204"/>
+        <a:ea typeface=""/>
+        <a:cs typeface=""/>
+        <a:font script="Jpan" typeface="游ゴシック"/>
+        <a:font script="Hang" typeface="맑은 고딕"/>
+        <a:font script="Hans" typeface="等线"/>
+        <a:font script="Hant" typeface="新細明體"/>
+        <a:font script="Arab" typeface="Arial"/>
+        <a:font script="Hebr" typeface="Arial"/>
+        <a:font script="Thai" typeface="Cordia New"/>
+        <a:font script="Ethi" typeface="Nyala"/>
+        <a:font script="Beng" typeface="Vrinda"/>
+        <a:font script="Gujr" typeface="Shruti"/>
+        <a:font script="Khmr" typeface="DaunPenh"/>
+        <a:font script="Knda" typeface="Tunga"/>
+        <a:font script="Guru" typeface="Raavi"/>
+        <a:font script="Cans" typeface="Euphemia"/>
+        <a:font script="Cher" typeface="Plantagenet Cherokee"/>
+        <a:font script="Yiii" typeface="Microsoft Yi Baiti"/>
+        <a:font script="Tibt" typeface="Microsoft Himalaya"/>
+        <a:font script="Thaa" typeface="MV Boli"/>
+        <a:font script="Deva" typeface="Mangal"/>
+        <a:font script="Telu" typeface="Gautami"/>
+        <a:font script="Taml" typeface="Latha"/>
+        <a:font script="Syrc" typeface="Estrangelo Edessa"/>
+        <a:font script="Orya" typeface="Kalinga"/>
+        <a:font script="Mlym" typeface="Kartika"/>
+        <a:font script="Laoo" typeface="DokChampa"/>
+        <a:font script="Sinh" typeface="Iskoola Pota"/>
+        <a:font script="Mong" typeface="Mongolian Baiti"/>
+        <a:font script="Viet" typeface="Arial"/>
+        <a:font script="Uigh" typeface="Microsoft Uighur"/>
+        <a:font script="Geor" typeface="Sylfaen"/>
+        <a:font script="Armn" typeface="Arial"/>
+        <a:font script="Bugi" typeface="Leelawadee UI"/>
+        <a:font script="Bopo" typeface="Microsoft JhengHei"/>
+        <a:font script="Java" typeface="Javanese Text"/>
+        <a:font script="Lisu" typeface="Segoe UI"/>
+        <a:font script="Mymr" typeface="Myanmar Text"/>
+        <a:font script="Nkoo" typeface="Ebrima"/>
+        <a:font script="Olck" typeface="Nirmala UI"/>
+        <a:font script="Osma" typeface="Ebrima"/>
+        <a:font script="Phag" typeface="Phagspa"/>
+        <a:font script="Syrn" typeface="Estrangelo Edessa"/>
+        <a:font script="Syrj" typeface="Estrangelo Edessa"/>
+        <a:font script="Syre" typeface="Estrangelo Edessa"/>
+        <a:font script="Sora" typeface="Nirmala UI"/>
+        <a:font script="Tale" typeface="Microsoft Tai Le"/>
+        <a:font script="Talu" typeface="Microsoft New Tai Lue"/>
+        <a:font script="Tfng" typeface="Ebrima"/>
+      </a:minorFont>
+    </a:fontScheme>
+    <a:fmtScheme name="Office">
+      <a:fillStyleLst>
+        <a:solidFill>
+          <a:schemeClr val="phClr"/>
+        </a:solidFill>
+        <a:gradFill rotWithShape="1">
+          <a:gsLst>
+            <a:gs pos="0">
+              <a:schemeClr val="phClr">
+                <a:lumMod val="110000"/>
+                <a:satMod val="105000"/>
+                <a:tint val="67000"/>
+              </a:schemeClr>
+            </a:gs>
+            <a:gs pos="50000">
+              <a:schemeClr val="phClr">
+                <a:lumMod val="105000"/>
+                <a:satMod val="103000"/>
+                <a:tint val="73000"/>
+              </a:schemeClr>
+            </a:gs>
+            <a:gs pos="100000">
+              <a:schemeClr val="phClr">
+                <a:lumMod val="105000"/>
+                <a:satMod val="109000"/>
+                <a:tint val="81000"/>
+              </a:schemeClr>
+            </a:gs>
+          </a:gsLst>
+          <a:lin ang="5400000" scaled="0"/>
+        </a:gradFill>
+        <a:gradFill rotWithShape="1">
+          <a:gsLst>
+            <a:gs pos="0">
+              <a:schemeClr val="phClr">
+                <a:satMod val="103000"/>
+                <a:lumMod val="102000"/>
+                <a:tint val="94000"/>
+              </a:schemeClr>
+            </a:gs>
+            <a:gs pos="50000">
+              <a:schemeClr val="phClr">
+                <a:satMod val="110000"/>
+                <a:lumMod val="100000"/>
+                <a:shade val="100000"/>
+              </a:schemeClr>
+            </a:gs>
+            <a:gs pos="100000">
+              <a:schemeClr val="phClr">
+                <a:lumMod val="99000"/>
+                <a:satMod val="120000"/>
+                <a:shade val="78000"/>
+              </a:schemeClr>
+            </a:gs>
+          </a:gsLst>
+          <a:lin ang="5400000" scaled="0"/>
+        </a:gradFill>
+      </a:fillStyleLst>
+      <a:lnStyleLst>
+        <a:ln w="6350" cap="flat" cmpd="sng" algn="ctr">
+          <a:solidFill>
+            <a:schemeClr val="phClr"/>
+          </a:solidFill>
+          <a:prstDash val="solid"/>
+          <a:miter lim="800000"/>
+        </a:ln>
+        <a:ln w="12700" cap="flat" cmpd="sng" algn="ctr">
+          <a:solidFill>
+            <a:schemeClr val="phClr"/>
+          </a:solidFill>
+          <a:prstDash val="solid"/>
+          <a:miter lim="800000"/>
+        </a:ln>
+        <a:ln w="19050" cap="flat" cmpd="sng" algn="ctr">
+          <a:solidFill>
+            <a:schemeClr val="phClr"/>
+          </a:solidFill>
+          <a:prstDash val="solid"/>
+          <a:miter lim="800000"/>
+        </a:ln>
+      </a:lnStyleLst>
+      <a:effectStyleLst>
+        <a:effectStyle>
+          <a:effectLst/>
+        </a:effectStyle>
+        <a:effectStyle>
+          <a:effectLst/>
+        </a:effectStyle>
+        <a:effectStyle>
+          <a:effectLst>
+            <a:outerShdw blurRad="57150" dist="19050" dir="5400000" algn="ctr" rotWithShape="0">
+              <a:srgbClr val="000000">
+                <a:alpha val="63000"/>
+              </a:srgbClr>
+            </a:outerShdw>
+          </a:effectLst>
+        </a:effectStyle>
+      </a:effectStyleLst>
+      <a:bgFillStyleLst>
+        <a:solidFill>
+          <a:schemeClr val="phClr"/>
+        </a:solidFill>
+        <a:solidFill>
+          <a:schemeClr val="phClr">
+            <a:tint val="95000"/>
+            <a:satMod val="170000"/>
+          </a:schemeClr>
+        </a:solidFill>
+        <a:gradFill rotWithShape="1">
+          <a:gsLst>
+            <a:gs pos="0">
+              <a:schemeClr val="phClr">
+                <a:tint val="93000"/>
+                <a:satMod val="150000"/>
+                <a:shade val="98000"/>
+                <a:lumMod val="102000"/>
+              </a:schemeClr>
+            </a:gs>
+            <a:gs pos="50000">
+              <a:schemeClr val="phClr">
+                <a:tint val="98000"/>
+                <a:satMod val="130000"/>
+                <a:shade val="90000"/>
+                <a:lumMod val="103000"/>
+              </a:schemeClr>
+            </a:gs>
+            <a:gs pos="100000">
+              <a:schemeClr val="phClr">
+                <a:shade val="63000"/>
+                <a:satMod val="120000"/>
+              </a:schemeClr>
+            </a:gs>
+          </a:gsLst>
+          <a:lin ang="5400000" scaled="0"/>
+        </a:gradFill>
+      </a:bgFillStyleLst>
+    </a:fmtScheme>
+  </a:themeElements>
+  <a:objectDefaults/>
+  <a:extraClrSchemeLst/>
+  <a:extLst>
+    <a:ext uri="{05A4C25C-085E-4340-85A3-A5531E510DB2}">
+      <thm15:themeFamily xmlns:thm15="http://schemas.microsoft.com/office/thememl/2012/main" name="Office Theme" id="{62F939B6-93AF-4DB8-9C6B-D6C7DFDC589F}" vid="{4A3C46E8-61CC-4603-A589-7422A47A8E4A}"/>
+    </a:ext>
+  </a:extLst>
+</a:theme>
 </file>
</xml_diff>